<commit_message>
updating control flow slides
</commit_message>
<xml_diff>
--- a/C5-Environment.pptx
+++ b/C5-Environment.pptx
@@ -246,7 +246,7 @@
           <a:p>
             <a:fld id="{3DDCD410-1135-1A43-BC4A-A4483F1AE565}" type="datetimeFigureOut">
               <a:rPr lang="en-US" smtClean="0"/>
-              <a:t>3/25/20</a:t>
+              <a:t>11/9/20</a:t>
             </a:fld>
             <a:endParaRPr lang="en-US"/>
           </a:p>
@@ -660,7 +660,7 @@
           <a:p>
             <a:fld id="{5AA802D9-C219-6247-A331-9290D86C7ECB}" type="datetime1">
               <a:rPr lang="en-US" smtClean="0"/>
-              <a:t>3/25/20</a:t>
+              <a:t>11/9/20</a:t>
             </a:fld>
             <a:endParaRPr lang="en-US"/>
           </a:p>
@@ -861,7 +861,7 @@
           <a:p>
             <a:fld id="{DFFD4F7A-4BEE-E04E-8FF1-88203C5CDAC9}" type="datetime1">
               <a:rPr lang="en-US" smtClean="0"/>
-              <a:t>3/25/20</a:t>
+              <a:t>11/9/20</a:t>
             </a:fld>
             <a:endParaRPr lang="en-US"/>
           </a:p>
@@ -1072,7 +1072,7 @@
           <a:p>
             <a:fld id="{5BBD2C28-C51F-E044-95E1-C588E28638F6}" type="datetime1">
               <a:rPr lang="en-US" smtClean="0"/>
-              <a:t>3/25/20</a:t>
+              <a:t>11/9/20</a:t>
             </a:fld>
             <a:endParaRPr lang="en-US"/>
           </a:p>
@@ -1273,7 +1273,7 @@
           <a:p>
             <a:fld id="{7AC11B53-E4EA-5C48-8419-E72C126F15B3}" type="datetime1">
               <a:rPr lang="en-US" smtClean="0"/>
-              <a:t>3/25/20</a:t>
+              <a:t>11/9/20</a:t>
             </a:fld>
             <a:endParaRPr lang="en-US"/>
           </a:p>
@@ -1551,7 +1551,7 @@
           <a:p>
             <a:fld id="{B01B0FF9-FCBE-544A-94C6-2BA12B0C9260}" type="datetime1">
               <a:rPr lang="en-US" smtClean="0"/>
-              <a:t>3/25/20</a:t>
+              <a:t>11/9/20</a:t>
             </a:fld>
             <a:endParaRPr lang="en-US"/>
           </a:p>
@@ -1819,7 +1819,7 @@
           <a:p>
             <a:fld id="{8B50EDB5-168C-354C-A18A-92D11A030CBA}" type="datetime1">
               <a:rPr lang="en-US" smtClean="0"/>
-              <a:t>3/25/20</a:t>
+              <a:t>11/9/20</a:t>
             </a:fld>
             <a:endParaRPr lang="en-US"/>
           </a:p>
@@ -2234,7 +2234,7 @@
           <a:p>
             <a:fld id="{6372ABC9-E912-234A-8BDA-17B86FF59656}" type="datetime1">
               <a:rPr lang="en-US" smtClean="0"/>
-              <a:t>3/25/20</a:t>
+              <a:t>11/9/20</a:t>
             </a:fld>
             <a:endParaRPr lang="en-US"/>
           </a:p>
@@ -2378,7 +2378,7 @@
           <a:p>
             <a:fld id="{3B0D2188-E9A1-6642-8E86-20A0EBB080CE}" type="datetime1">
               <a:rPr lang="en-US" smtClean="0"/>
-              <a:t>3/25/20</a:t>
+              <a:t>11/9/20</a:t>
             </a:fld>
             <a:endParaRPr lang="en-US"/>
           </a:p>
@@ -2494,7 +2494,7 @@
           <a:p>
             <a:fld id="{F7163B03-91BB-1C42-BA04-FE8D7A2B3541}" type="datetime1">
               <a:rPr lang="en-US" smtClean="0"/>
-              <a:t>3/25/20</a:t>
+              <a:t>11/9/20</a:t>
             </a:fld>
             <a:endParaRPr lang="en-US"/>
           </a:p>
@@ -2808,7 +2808,7 @@
           <a:p>
             <a:fld id="{3EEDDDEB-E34B-B74A-9190-EC00D43F25D2}" type="datetime1">
               <a:rPr lang="en-US" smtClean="0"/>
-              <a:t>3/25/20</a:t>
+              <a:t>11/9/20</a:t>
             </a:fld>
             <a:endParaRPr lang="en-US"/>
           </a:p>
@@ -3099,7 +3099,7 @@
           <a:p>
             <a:fld id="{61475C3B-F6C0-A34A-BF2E-259A0C3300A8}" type="datetime1">
               <a:rPr lang="en-US" smtClean="0"/>
-              <a:t>3/25/20</a:t>
+              <a:t>11/9/20</a:t>
             </a:fld>
             <a:endParaRPr lang="en-US"/>
           </a:p>
@@ -3343,7 +3343,7 @@
           <a:p>
             <a:fld id="{4DE4DFB1-B975-BB4C-8839-29A105CEBE0D}" type="datetime1">
               <a:rPr lang="en-US" smtClean="0"/>
-              <a:t>3/25/20</a:t>
+              <a:t>11/9/20</a:t>
             </a:fld>
             <a:endParaRPr lang="en-US"/>
           </a:p>
@@ -32603,7 +32603,7 @@
 </file>
 
 <file path=ppt/slides/slide48.xml><?xml version="1.0" encoding="utf-8"?>
-<p:sld xmlns:a="http://schemas.openxmlformats.org/drawingml/2006/main" xmlns:r="http://schemas.openxmlformats.org/officeDocument/2006/relationships" xmlns:p="http://schemas.openxmlformats.org/presentationml/2006/main">
+<p:sld xmlns:a="http://schemas.openxmlformats.org/drawingml/2006/main" xmlns:r="http://schemas.openxmlformats.org/officeDocument/2006/relationships" xmlns:p="http://schemas.openxmlformats.org/presentationml/2006/main" show="0">
   <p:cSld>
     <p:spTree>
       <p:nvGrpSpPr>
@@ -33426,7 +33426,7 @@
 </file>
 
 <file path=ppt/slides/slide49.xml><?xml version="1.0" encoding="utf-8"?>
-<p:sld xmlns:a="http://schemas.openxmlformats.org/drawingml/2006/main" xmlns:r="http://schemas.openxmlformats.org/officeDocument/2006/relationships" xmlns:p="http://schemas.openxmlformats.org/presentationml/2006/main">
+<p:sld xmlns:a="http://schemas.openxmlformats.org/drawingml/2006/main" xmlns:r="http://schemas.openxmlformats.org/officeDocument/2006/relationships" xmlns:p="http://schemas.openxmlformats.org/presentationml/2006/main" show="0">
   <p:cSld>
     <p:spTree>
       <p:nvGrpSpPr>
@@ -33791,7 +33791,7 @@
 </file>
 
 <file path=ppt/slides/slide50.xml><?xml version="1.0" encoding="utf-8"?>
-<p:sld xmlns:a="http://schemas.openxmlformats.org/drawingml/2006/main" xmlns:r="http://schemas.openxmlformats.org/officeDocument/2006/relationships" xmlns:p="http://schemas.openxmlformats.org/presentationml/2006/main">
+<p:sld xmlns:a="http://schemas.openxmlformats.org/drawingml/2006/main" xmlns:r="http://schemas.openxmlformats.org/officeDocument/2006/relationships" xmlns:p="http://schemas.openxmlformats.org/presentationml/2006/main" show="0">
   <p:cSld>
     <p:spTree>
       <p:nvGrpSpPr>

</xml_diff>